<commit_message>
presentation performances are updated
</commit_message>
<xml_diff>
--- a/Presentation/Final Presentation/Final Presentation.pptx
+++ b/Presentation/Final Presentation/Final Presentation.pptx
@@ -11,8 +11,8 @@
     <p:sldId id="275" r:id="rId5"/>
     <p:sldId id="277" r:id="rId6"/>
     <p:sldId id="257" r:id="rId7"/>
-    <p:sldId id="280" r:id="rId8"/>
-    <p:sldId id="278" r:id="rId9"/>
+    <p:sldId id="278" r:id="rId8"/>
+    <p:sldId id="282" r:id="rId9"/>
     <p:sldId id="281" r:id="rId10"/>
     <p:sldId id="276" r:id="rId11"/>
     <p:sldId id="269" r:id="rId12"/>
@@ -348,7 +348,7 @@
           <a:p>
             <a:fld id="{BAAFB08A-6EA4-4239-B3C7-558C59471976}" type="datetimeFigureOut">
               <a:rPr lang="en-US" smtClean="0"/>
-              <a:t>6/20/2020</a:t>
+              <a:t>6/21/2020</a:t>
             </a:fld>
             <a:endParaRPr lang="en-US"/>
           </a:p>
@@ -556,7 +556,7 @@
           <a:p>
             <a:fld id="{BAAFB08A-6EA4-4239-B3C7-558C59471976}" type="datetimeFigureOut">
               <a:rPr lang="en-US" smtClean="0"/>
-              <a:t>6/20/2020</a:t>
+              <a:t>6/21/2020</a:t>
             </a:fld>
             <a:endParaRPr lang="en-US"/>
           </a:p>
@@ -812,7 +812,7 @@
           <a:p>
             <a:fld id="{BAAFB08A-6EA4-4239-B3C7-558C59471976}" type="datetimeFigureOut">
               <a:rPr lang="en-US" smtClean="0"/>
-              <a:t>6/20/2020</a:t>
+              <a:t>6/21/2020</a:t>
             </a:fld>
             <a:endParaRPr lang="en-US"/>
           </a:p>
@@ -986,7 +986,7 @@
           <a:p>
             <a:fld id="{BAAFB08A-6EA4-4239-B3C7-558C59471976}" type="datetimeFigureOut">
               <a:rPr lang="en-US" smtClean="0"/>
-              <a:t>6/20/2020</a:t>
+              <a:t>6/21/2020</a:t>
             </a:fld>
             <a:endParaRPr lang="en-US"/>
           </a:p>
@@ -1329,7 +1329,7 @@
           <a:p>
             <a:fld id="{BAAFB08A-6EA4-4239-B3C7-558C59471976}" type="datetimeFigureOut">
               <a:rPr lang="en-US" smtClean="0"/>
-              <a:t>6/20/2020</a:t>
+              <a:t>6/21/2020</a:t>
             </a:fld>
             <a:endParaRPr lang="en-US"/>
           </a:p>
@@ -1604,7 +1604,7 @@
           <a:p>
             <a:fld id="{BAAFB08A-6EA4-4239-B3C7-558C59471976}" type="datetimeFigureOut">
               <a:rPr lang="en-US" smtClean="0"/>
-              <a:t>6/20/2020</a:t>
+              <a:t>6/21/2020</a:t>
             </a:fld>
             <a:endParaRPr lang="en-US"/>
           </a:p>
@@ -1983,7 +1983,7 @@
           <a:p>
             <a:fld id="{BAAFB08A-6EA4-4239-B3C7-558C59471976}" type="datetimeFigureOut">
               <a:rPr lang="en-US" smtClean="0"/>
-              <a:t>6/20/2020</a:t>
+              <a:t>6/21/2020</a:t>
             </a:fld>
             <a:endParaRPr lang="en-US"/>
           </a:p>
@@ -2101,7 +2101,7 @@
           <a:p>
             <a:fld id="{BAAFB08A-6EA4-4239-B3C7-558C59471976}" type="datetimeFigureOut">
               <a:rPr lang="en-US" smtClean="0"/>
-              <a:t>6/20/2020</a:t>
+              <a:t>6/21/2020</a:t>
             </a:fld>
             <a:endParaRPr lang="en-US"/>
           </a:p>
@@ -2272,7 +2272,7 @@
           <a:p>
             <a:fld id="{BAAFB08A-6EA4-4239-B3C7-558C59471976}" type="datetimeFigureOut">
               <a:rPr lang="en-US" smtClean="0"/>
-              <a:t>6/20/2020</a:t>
+              <a:t>6/21/2020</a:t>
             </a:fld>
             <a:endParaRPr lang="en-US"/>
           </a:p>
@@ -2626,7 +2626,7 @@
           <a:p>
             <a:fld id="{BAAFB08A-6EA4-4239-B3C7-558C59471976}" type="datetimeFigureOut">
               <a:rPr lang="en-US" smtClean="0"/>
-              <a:t>6/20/2020</a:t>
+              <a:t>6/21/2020</a:t>
             </a:fld>
             <a:endParaRPr lang="en-US"/>
           </a:p>
@@ -3008,7 +3008,7 @@
           <a:p>
             <a:fld id="{BAAFB08A-6EA4-4239-B3C7-558C59471976}" type="datetimeFigureOut">
               <a:rPr lang="en-US" smtClean="0"/>
-              <a:t>6/20/2020</a:t>
+              <a:t>6/21/2020</a:t>
             </a:fld>
             <a:endParaRPr lang="en-US"/>
           </a:p>
@@ -3295,7 +3295,7 @@
           <a:p>
             <a:fld id="{BAAFB08A-6EA4-4239-B3C7-558C59471976}" type="datetimeFigureOut">
               <a:rPr lang="en-US" smtClean="0"/>
-              <a:t>6/20/2020</a:t>
+              <a:t>6/21/2020</a:t>
             </a:fld>
             <a:endParaRPr lang="en-US"/>
           </a:p>
@@ -3850,6 +3850,28 @@
               <a:rPr lang="en-US" sz="4400" dirty="0"/>
             </a:br>
             <a:r>
+              <a:rPr lang="tr-TR" sz="4400" dirty="0" err="1"/>
+              <a:t>Cmpe</a:t>
+            </a:r>
+            <a:r>
+              <a:rPr lang="tr-TR" sz="4400" dirty="0"/>
+              <a:t> 493</a:t>
+            </a:r>
+            <a:br>
+              <a:rPr lang="tr-TR" sz="4400" dirty="0"/>
+            </a:br>
+            <a:r>
+              <a:rPr lang="tr-TR" sz="4400" dirty="0"/>
+              <a:t>Information </a:t>
+            </a:r>
+            <a:r>
+              <a:rPr lang="tr-TR" sz="4400" dirty="0" err="1"/>
+              <a:t>Retrieval</a:t>
+            </a:r>
+            <a:br>
+              <a:rPr lang="tr-TR" sz="4400" dirty="0"/>
+            </a:br>
+            <a:r>
               <a:rPr lang="en-US" sz="4400" dirty="0"/>
               <a:t>Term Project </a:t>
             </a:r>
@@ -4209,10 +4231,6 @@
               <a:buChar char="Ø"/>
             </a:pPr>
             <a:r>
-              <a:rPr lang="en-US" sz="2500" dirty="0"/>
-              <a:t>Part 1: </a:t>
-            </a:r>
-            <a:r>
               <a:rPr lang="tr-TR" sz="2500" dirty="0" err="1"/>
               <a:t>What</a:t>
             </a:r>
@@ -4239,36 +4257,8 @@
               <a:buChar char="Ø"/>
             </a:pPr>
             <a:r>
-              <a:rPr lang="en-US" sz="2500" dirty="0"/>
-              <a:t>Part 2: </a:t>
-            </a:r>
-            <a:r>
               <a:rPr lang="tr-TR" sz="2500" dirty="0" err="1"/>
-              <a:t>What</a:t>
-            </a:r>
-            <a:r>
-              <a:rPr lang="tr-TR" sz="2500" dirty="0"/>
-              <a:t> </a:t>
-            </a:r>
-            <a:r>
-              <a:rPr lang="tr-TR" sz="2500" dirty="0" err="1"/>
-              <a:t>we</a:t>
-            </a:r>
-            <a:r>
-              <a:rPr lang="tr-TR" sz="2500" dirty="0"/>
-              <a:t> </a:t>
-            </a:r>
-            <a:r>
-              <a:rPr lang="tr-TR" sz="2500" dirty="0" err="1"/>
-              <a:t>have</a:t>
-            </a:r>
-            <a:r>
-              <a:rPr lang="tr-TR" sz="2500" dirty="0"/>
-              <a:t> </a:t>
-            </a:r>
-            <a:r>
-              <a:rPr lang="tr-TR" sz="2500" dirty="0" err="1"/>
-              <a:t>added</a:t>
+              <a:t>Improvements</a:t>
             </a:r>
             <a:r>
               <a:rPr lang="en-US" sz="2500" dirty="0"/>
@@ -4287,14 +4277,6 @@
             </a:pPr>
             <a:r>
               <a:rPr lang="tr-TR" sz="2500" dirty="0" err="1"/>
-              <a:t>Part</a:t>
-            </a:r>
-            <a:r>
-              <a:rPr lang="tr-TR" sz="2500" dirty="0"/>
-              <a:t> 3: </a:t>
-            </a:r>
-            <a:r>
-              <a:rPr lang="tr-TR" sz="2500" dirty="0" err="1"/>
               <a:t>Evaluations</a:t>
             </a:r>
             <a:r>
@@ -4309,16 +4291,16 @@
               <a:buChar char="Ø"/>
             </a:pPr>
             <a:r>
+              <a:rPr lang="tr-TR" sz="2500" dirty="0" err="1"/>
+              <a:t>Thoughts</a:t>
+            </a:r>
+            <a:r>
+              <a:rPr lang="tr-TR" sz="2500" dirty="0"/>
+              <a:t> on </a:t>
+            </a:r>
+            <a:r>
               <a:rPr lang="en-US" sz="2500" dirty="0"/>
-              <a:t>Part </a:t>
-            </a:r>
-            <a:r>
-              <a:rPr lang="tr-TR" sz="2500" dirty="0"/>
-              <a:t>4</a:t>
-            </a:r>
-            <a:r>
-              <a:rPr lang="en-US" sz="2500" dirty="0"/>
-              <a:t>: Future Work, Abdullah Yıldız</a:t>
+              <a:t>Future Work, Abdullah Yıldız</a:t>
             </a:r>
           </a:p>
         </p:txBody>
@@ -5474,7 +5456,7 @@
             </a:pPr>
             <a:r>
               <a:rPr lang="tr-TR" sz="2000" dirty="0" err="1"/>
-              <a:t>Jacard</a:t>
+              <a:t>Tf-idf</a:t>
             </a:r>
             <a:r>
               <a:rPr lang="tr-TR" sz="2000" dirty="0"/>
@@ -5482,7 +5464,7 @@
             </a:r>
             <a:r>
               <a:rPr lang="tr-TR" sz="2000" dirty="0" err="1"/>
-              <a:t>Similarity</a:t>
+              <a:t>Vectors</a:t>
             </a:r>
             <a:r>
               <a:rPr lang="tr-TR" sz="2000" dirty="0"/>
@@ -5490,7 +5472,7 @@
             </a:r>
             <a:r>
               <a:rPr lang="tr-TR" sz="2000" dirty="0" err="1"/>
-              <a:t>by</a:t>
+              <a:t>onto</a:t>
             </a:r>
             <a:r>
               <a:rPr lang="tr-TR" sz="2000" dirty="0"/>
@@ -5498,7 +5480,7 @@
             </a:r>
             <a:r>
               <a:rPr lang="tr-TR" sz="2000" dirty="0" err="1"/>
-              <a:t>tokens</a:t>
+              <a:t>Biotope</a:t>
             </a:r>
             <a:endParaRPr lang="tr-TR" sz="2000" dirty="0"/>
           </a:p>
@@ -5510,7 +5492,7 @@
             </a:pPr>
             <a:r>
               <a:rPr lang="tr-TR" sz="1800" dirty="0" err="1"/>
-              <a:t>Improved</a:t>
+              <a:t>Improvement</a:t>
             </a:r>
             <a:r>
               <a:rPr lang="tr-TR" sz="1800" dirty="0"/>
@@ -5518,19 +5500,11 @@
             </a:r>
             <a:r>
               <a:rPr lang="tr-TR" sz="1800" dirty="0" err="1"/>
-              <a:t>performance</a:t>
+              <a:t>by</a:t>
             </a:r>
             <a:r>
               <a:rPr lang="tr-TR" sz="1800" dirty="0"/>
-              <a:t> </a:t>
-            </a:r>
-            <a:r>
-              <a:rPr lang="tr-TR" sz="1800" dirty="0" err="1"/>
-              <a:t>by</a:t>
-            </a:r>
-            <a:r>
-              <a:rPr lang="tr-TR" sz="1800" dirty="0"/>
-              <a:t> .% </a:t>
+              <a:t>  1%</a:t>
             </a:r>
           </a:p>
           <a:p>
@@ -5545,11 +5519,11 @@
             </a:r>
             <a:r>
               <a:rPr lang="tr-TR" sz="1800" b="1" dirty="0"/>
-              <a:t>: .</a:t>
+              <a:t>: </a:t>
             </a:r>
             <a:r>
               <a:rPr lang="tr-TR" sz="1800" dirty="0"/>
-              <a:t>%  </a:t>
+              <a:t>39% </a:t>
             </a:r>
             <a:r>
               <a:rPr lang="tr-TR" sz="1800" dirty="0" err="1"/>
@@ -5567,6 +5541,7 @@
               <a:rPr lang="tr-TR" sz="1800" dirty="0"/>
               <a:t> in dev set</a:t>
             </a:r>
+            <a:endParaRPr lang="tr-TR" sz="2000" dirty="0"/>
           </a:p>
           <a:p>
             <a:pPr marL="91440" lvl="2" indent="-91440">
@@ -5602,8 +5577,13 @@
             </a:r>
             <a:r>
               <a:rPr lang="tr-TR" sz="2000" dirty="0"/>
-              <a:t> 2-grams</a:t>
-            </a:r>
+              <a:t> </a:t>
+            </a:r>
+            <a:r>
+              <a:rPr lang="tr-TR" sz="2000" dirty="0" err="1"/>
+              <a:t>tokens</a:t>
+            </a:r>
+            <a:endParaRPr lang="tr-TR" sz="2000" dirty="0"/>
           </a:p>
           <a:p>
             <a:pPr lvl="3">
@@ -5633,7 +5613,7 @@
             </a:r>
             <a:r>
               <a:rPr lang="tr-TR" sz="1800" dirty="0"/>
-              <a:t> .% </a:t>
+              <a:t> 2% </a:t>
             </a:r>
           </a:p>
           <a:p>
@@ -5648,11 +5628,11 @@
             </a:r>
             <a:r>
               <a:rPr lang="tr-TR" sz="1800" b="1" dirty="0"/>
-              <a:t>: .</a:t>
+              <a:t>: </a:t>
             </a:r>
             <a:r>
               <a:rPr lang="tr-TR" sz="1800" dirty="0"/>
-              <a:t>%  </a:t>
+              <a:t>41%  </a:t>
             </a:r>
             <a:r>
               <a:rPr lang="tr-TR" sz="1800" dirty="0" err="1"/>
@@ -5701,27 +5681,11 @@
             </a:r>
             <a:r>
               <a:rPr lang="tr-TR" sz="2000" dirty="0" err="1"/>
-              <a:t>Average</a:t>
+              <a:t>by</a:t>
             </a:r>
             <a:r>
               <a:rPr lang="tr-TR" sz="2000" dirty="0"/>
-              <a:t> (n-</a:t>
-            </a:r>
-            <a:r>
-              <a:rPr lang="tr-TR" sz="2000" dirty="0" err="1"/>
-              <a:t>grams</a:t>
-            </a:r>
-            <a:r>
-              <a:rPr lang="tr-TR" sz="2000" dirty="0"/>
-              <a:t> + </a:t>
-            </a:r>
-            <a:r>
-              <a:rPr lang="tr-TR" sz="2000" dirty="0" err="1"/>
-              <a:t>tokens</a:t>
-            </a:r>
-            <a:r>
-              <a:rPr lang="tr-TR" sz="2000" dirty="0"/>
-              <a:t>)</a:t>
+              <a:t> 2-grams</a:t>
             </a:r>
           </a:p>
           <a:p>
@@ -5752,7 +5716,7 @@
             </a:r>
             <a:r>
               <a:rPr lang="tr-TR" sz="1800" dirty="0"/>
-              <a:t> .% </a:t>
+              <a:t> 6% </a:t>
             </a:r>
           </a:p>
           <a:p>
@@ -5767,11 +5731,11 @@
             </a:r>
             <a:r>
               <a:rPr lang="tr-TR" sz="1800" b="1" dirty="0"/>
-              <a:t>: .</a:t>
+              <a:t>: </a:t>
             </a:r>
             <a:r>
               <a:rPr lang="tr-TR" sz="1800" dirty="0"/>
-              <a:t>%  </a:t>
+              <a:t>47%  </a:t>
             </a:r>
             <a:r>
               <a:rPr lang="tr-TR" sz="1800" dirty="0" err="1"/>
@@ -5789,8 +5753,6 @@
               <a:rPr lang="tr-TR" sz="1800" dirty="0"/>
               <a:t> in dev set</a:t>
             </a:r>
-          </a:p>
-          <a:p>
             <a:endParaRPr lang="en-US" dirty="0"/>
           </a:p>
           <a:p>
@@ -5853,7 +5815,12 @@
             <p:ph type="title"/>
           </p:nvPr>
         </p:nvSpPr>
-        <p:spPr/>
+        <p:spPr>
+          <a:xfrm>
+            <a:off x="1097280" y="258467"/>
+            <a:ext cx="10058400" cy="1450757"/>
+          </a:xfrm>
+        </p:spPr>
         <p:txBody>
           <a:bodyPr>
             <a:normAutofit/>
@@ -5910,16 +5877,324 @@
         </p:nvSpPr>
         <p:spPr/>
         <p:txBody>
-          <a:bodyPr/>
+          <a:bodyPr>
+            <a:normAutofit/>
+          </a:bodyPr>
           <a:lstStyle/>
           <a:p>
-            <a:pPr>
+            <a:pPr marL="91440" lvl="2" indent="-91440">
+              <a:spcBef>
+                <a:spcPts val="1200"/>
+              </a:spcBef>
+              <a:spcAft>
+                <a:spcPts val="200"/>
+              </a:spcAft>
+              <a:buSzPct val="100000"/>
               <a:buFont typeface="Wingdings" panose="05000000000000000000" pitchFamily="2" charset="2"/>
               <a:buChar char="Ø"/>
             </a:pPr>
             <a:r>
-              <a:rPr lang="en-US" dirty="0"/>
-              <a:t>TF-IDF</a:t>
+              <a:rPr lang="tr-TR" sz="2000" dirty="0" err="1"/>
+              <a:t>Jacard</a:t>
+            </a:r>
+            <a:r>
+              <a:rPr lang="tr-TR" sz="2000" dirty="0"/>
+              <a:t> </a:t>
+            </a:r>
+            <a:r>
+              <a:rPr lang="tr-TR" sz="2000" dirty="0" err="1"/>
+              <a:t>Similarity</a:t>
+            </a:r>
+            <a:r>
+              <a:rPr lang="tr-TR" sz="2000" dirty="0"/>
+              <a:t> </a:t>
+            </a:r>
+            <a:r>
+              <a:rPr lang="tr-TR" sz="2000" dirty="0" err="1"/>
+              <a:t>Average</a:t>
+            </a:r>
+            <a:r>
+              <a:rPr lang="tr-TR" sz="2000" dirty="0"/>
+              <a:t> (n-</a:t>
+            </a:r>
+            <a:r>
+              <a:rPr lang="tr-TR" sz="2000" dirty="0" err="1"/>
+              <a:t>grams</a:t>
+            </a:r>
+            <a:r>
+              <a:rPr lang="tr-TR" sz="2000" dirty="0"/>
+              <a:t> + </a:t>
+            </a:r>
+            <a:r>
+              <a:rPr lang="tr-TR" sz="2000" dirty="0" err="1"/>
+              <a:t>tokens</a:t>
+            </a:r>
+            <a:r>
+              <a:rPr lang="tr-TR" sz="2000" dirty="0"/>
+              <a:t>)</a:t>
+            </a:r>
+          </a:p>
+          <a:p>
+            <a:pPr lvl="3">
+              <a:lnSpc>
+                <a:spcPct val="100000"/>
+              </a:lnSpc>
+            </a:pPr>
+            <a:r>
+              <a:rPr lang="tr-TR" sz="1800" dirty="0" err="1"/>
+              <a:t>Improved</a:t>
+            </a:r>
+            <a:r>
+              <a:rPr lang="tr-TR" sz="1800" dirty="0"/>
+              <a:t> </a:t>
+            </a:r>
+            <a:r>
+              <a:rPr lang="tr-TR" sz="1800" dirty="0" err="1"/>
+              <a:t>performance</a:t>
+            </a:r>
+            <a:r>
+              <a:rPr lang="tr-TR" sz="1800" dirty="0"/>
+              <a:t> </a:t>
+            </a:r>
+            <a:r>
+              <a:rPr lang="tr-TR" sz="1800" dirty="0" err="1"/>
+              <a:t>by</a:t>
+            </a:r>
+            <a:r>
+              <a:rPr lang="tr-TR" sz="1800" dirty="0"/>
+              <a:t> 4% </a:t>
+            </a:r>
+          </a:p>
+          <a:p>
+            <a:pPr lvl="3">
+              <a:lnSpc>
+                <a:spcPct val="100000"/>
+              </a:lnSpc>
+            </a:pPr>
+            <a:r>
+              <a:rPr lang="tr-TR" sz="1800" b="1" dirty="0" err="1"/>
+              <a:t>Performance</a:t>
+            </a:r>
+            <a:r>
+              <a:rPr lang="tr-TR" sz="1800" b="1" dirty="0"/>
+              <a:t>: </a:t>
+            </a:r>
+            <a:r>
+              <a:rPr lang="tr-TR" sz="1800" dirty="0"/>
+              <a:t>51%  </a:t>
+            </a:r>
+            <a:r>
+              <a:rPr lang="tr-TR" sz="1800" dirty="0" err="1"/>
+              <a:t>correct</a:t>
+            </a:r>
+            <a:r>
+              <a:rPr lang="tr-TR" sz="1800" dirty="0"/>
+              <a:t> </a:t>
+            </a:r>
+            <a:r>
+              <a:rPr lang="tr-TR" sz="1800" dirty="0" err="1"/>
+              <a:t>normalization</a:t>
+            </a:r>
+            <a:r>
+              <a:rPr lang="tr-TR" sz="1800" dirty="0"/>
+              <a:t> in dev set</a:t>
+            </a:r>
+            <a:endParaRPr lang="tr-TR" sz="2000" dirty="0"/>
+          </a:p>
+          <a:p>
+            <a:pPr marL="91440" lvl="2" indent="-91440">
+              <a:spcBef>
+                <a:spcPts val="1200"/>
+              </a:spcBef>
+              <a:spcAft>
+                <a:spcPts val="200"/>
+              </a:spcAft>
+              <a:buSzPct val="100000"/>
+              <a:buFont typeface="Wingdings" panose="05000000000000000000" pitchFamily="2" charset="2"/>
+              <a:buChar char="Ø"/>
+            </a:pPr>
+            <a:r>
+              <a:rPr lang="tr-TR" sz="2000" dirty="0"/>
+              <a:t>Pos-</a:t>
+            </a:r>
+            <a:r>
+              <a:rPr lang="tr-TR" sz="2000" dirty="0" err="1"/>
+              <a:t>tagging</a:t>
+            </a:r>
+            <a:r>
+              <a:rPr lang="tr-TR" sz="2000" dirty="0"/>
+              <a:t> </a:t>
+            </a:r>
+            <a:r>
+              <a:rPr lang="tr-TR" sz="2000" dirty="0" err="1"/>
+              <a:t>and</a:t>
+            </a:r>
+            <a:r>
+              <a:rPr lang="tr-TR" sz="2000" dirty="0"/>
+              <a:t> </a:t>
+            </a:r>
+            <a:r>
+              <a:rPr lang="tr-TR" sz="2000" dirty="0" err="1"/>
+              <a:t>using</a:t>
+            </a:r>
+            <a:r>
+              <a:rPr lang="tr-TR" sz="2000" dirty="0"/>
+              <a:t> </a:t>
+            </a:r>
+            <a:r>
+              <a:rPr lang="tr-TR" sz="2000" dirty="0" err="1"/>
+              <a:t>Headword</a:t>
+            </a:r>
+            <a:endParaRPr lang="tr-TR" sz="2000" dirty="0"/>
+          </a:p>
+          <a:p>
+            <a:pPr lvl="3">
+              <a:lnSpc>
+                <a:spcPct val="100000"/>
+              </a:lnSpc>
+            </a:pPr>
+            <a:r>
+              <a:rPr lang="tr-TR" sz="1800" dirty="0" err="1"/>
+              <a:t>Improvement</a:t>
+            </a:r>
+            <a:r>
+              <a:rPr lang="tr-TR" sz="1800" dirty="0"/>
+              <a:t> </a:t>
+            </a:r>
+            <a:r>
+              <a:rPr lang="tr-TR" sz="1800" dirty="0" err="1"/>
+              <a:t>by</a:t>
+            </a:r>
+            <a:r>
+              <a:rPr lang="tr-TR" sz="1800" dirty="0"/>
+              <a:t>  4.4%</a:t>
+            </a:r>
+          </a:p>
+          <a:p>
+            <a:pPr lvl="3">
+              <a:lnSpc>
+                <a:spcPct val="100000"/>
+              </a:lnSpc>
+            </a:pPr>
+            <a:r>
+              <a:rPr lang="tr-TR" sz="1800" b="1" dirty="0" err="1"/>
+              <a:t>Performance</a:t>
+            </a:r>
+            <a:r>
+              <a:rPr lang="tr-TR" sz="1800" b="1" dirty="0"/>
+              <a:t>: </a:t>
+            </a:r>
+            <a:r>
+              <a:rPr lang="tr-TR" sz="1800" dirty="0"/>
+              <a:t>55.4% </a:t>
+            </a:r>
+            <a:r>
+              <a:rPr lang="tr-TR" sz="1800" dirty="0" err="1"/>
+              <a:t>correct</a:t>
+            </a:r>
+            <a:r>
+              <a:rPr lang="tr-TR" sz="1800" dirty="0"/>
+              <a:t> </a:t>
+            </a:r>
+            <a:r>
+              <a:rPr lang="tr-TR" sz="1800" dirty="0" err="1"/>
+              <a:t>normalization</a:t>
+            </a:r>
+            <a:r>
+              <a:rPr lang="tr-TR" sz="1800" dirty="0"/>
+              <a:t> in dev set</a:t>
+            </a:r>
+          </a:p>
+          <a:p>
+            <a:pPr marL="91440" lvl="2" indent="-91440">
+              <a:spcBef>
+                <a:spcPts val="1200"/>
+              </a:spcBef>
+              <a:spcAft>
+                <a:spcPts val="200"/>
+              </a:spcAft>
+              <a:buSzPct val="100000"/>
+              <a:buFont typeface="Wingdings" panose="05000000000000000000" pitchFamily="2" charset="2"/>
+              <a:buChar char="Ø"/>
+            </a:pPr>
+            <a:r>
+              <a:rPr lang="tr-TR" sz="2000" dirty="0" err="1"/>
+              <a:t>Rule</a:t>
+            </a:r>
+            <a:r>
+              <a:rPr lang="tr-TR" sz="2000" dirty="0"/>
+              <a:t> </a:t>
+            </a:r>
+            <a:r>
+              <a:rPr lang="tr-TR" sz="2000" dirty="0" err="1"/>
+              <a:t>based</a:t>
+            </a:r>
+            <a:r>
+              <a:rPr lang="tr-TR" sz="2000" dirty="0"/>
+              <a:t> </a:t>
+            </a:r>
+            <a:r>
+              <a:rPr lang="tr-TR" sz="2000" dirty="0" err="1"/>
+              <a:t>Normalization</a:t>
+            </a:r>
+            <a:endParaRPr lang="tr-TR" sz="2000" dirty="0"/>
+          </a:p>
+          <a:p>
+            <a:pPr lvl="3">
+              <a:lnSpc>
+                <a:spcPct val="100000"/>
+              </a:lnSpc>
+            </a:pPr>
+            <a:r>
+              <a:rPr lang="tr-TR" sz="1800" dirty="0" err="1"/>
+              <a:t>Improvement</a:t>
+            </a:r>
+            <a:r>
+              <a:rPr lang="tr-TR" sz="1800" dirty="0"/>
+              <a:t> </a:t>
+            </a:r>
+            <a:r>
+              <a:rPr lang="tr-TR" sz="1800" dirty="0" err="1"/>
+              <a:t>by</a:t>
+            </a:r>
+            <a:r>
+              <a:rPr lang="tr-TR" sz="1800" dirty="0"/>
+              <a:t>  4.3 %</a:t>
+            </a:r>
+          </a:p>
+          <a:p>
+            <a:pPr lvl="3">
+              <a:lnSpc>
+                <a:spcPct val="100000"/>
+              </a:lnSpc>
+            </a:pPr>
+            <a:r>
+              <a:rPr lang="tr-TR" sz="1800" b="1" dirty="0" err="1"/>
+              <a:t>Performance</a:t>
+            </a:r>
+            <a:r>
+              <a:rPr lang="tr-TR" sz="1800" b="1" dirty="0"/>
+              <a:t>: </a:t>
+            </a:r>
+            <a:r>
+              <a:rPr lang="tr-TR" sz="1800" dirty="0"/>
+              <a:t>59.7% </a:t>
+            </a:r>
+            <a:r>
+              <a:rPr lang="tr-TR" sz="1800" dirty="0" err="1"/>
+              <a:t>correct</a:t>
+            </a:r>
+            <a:r>
+              <a:rPr lang="tr-TR" sz="1800" dirty="0"/>
+              <a:t> </a:t>
+            </a:r>
+            <a:r>
+              <a:rPr lang="tr-TR" sz="1800" dirty="0" err="1"/>
+              <a:t>normalization</a:t>
+            </a:r>
+            <a:r>
+              <a:rPr lang="tr-TR" sz="1800" dirty="0"/>
+              <a:t> in dev set</a:t>
             </a:r>
           </a:p>
           <a:p>
@@ -5928,19 +6203,20 @@
               <a:buChar char="Ø"/>
             </a:pPr>
             <a:r>
+              <a:rPr lang="tr-TR" dirty="0" err="1"/>
+              <a:t>e.g</a:t>
+            </a:r>
+            <a:r>
               <a:rPr lang="tr-TR" dirty="0"/>
-              <a:t>.</a:t>
-            </a:r>
-            <a:endParaRPr lang="en-US" dirty="0"/>
-          </a:p>
-          <a:p>
-            <a:pPr>
-              <a:buFont typeface="Wingdings" panose="05000000000000000000" pitchFamily="2" charset="2"/>
-              <a:buChar char="Ø"/>
-            </a:pPr>
-            <a:r>
-              <a:rPr lang="en-US" dirty="0"/>
-              <a:t>Improving TF-IDF</a:t>
+              <a:t>. ‘</a:t>
+            </a:r>
+            <a:r>
+              <a:rPr lang="tr-TR" dirty="0" err="1"/>
+              <a:t>rind</a:t>
+            </a:r>
+            <a:r>
+              <a:rPr lang="tr-TR" dirty="0"/>
+              <a:t>’</a:t>
             </a:r>
           </a:p>
           <a:p>
@@ -5949,11 +6225,42 @@
               <a:buChar char="Ø"/>
             </a:pPr>
             <a:r>
-              <a:rPr lang="en-US" dirty="0"/>
-              <a:t>BOW model -&gt; character-level, n-grams [2]</a:t>
-            </a:r>
-          </a:p>
-          <a:p>
+              <a:rPr lang="tr-TR" dirty="0" err="1"/>
+              <a:t>Cheese</a:t>
+            </a:r>
+            <a:r>
+              <a:rPr lang="tr-TR" dirty="0"/>
+              <a:t> </a:t>
+            </a:r>
+            <a:r>
+              <a:rPr lang="tr-TR" dirty="0" err="1"/>
+              <a:t>rind</a:t>
+            </a:r>
+            <a:r>
+              <a:rPr lang="tr-TR" dirty="0"/>
+              <a:t>, </a:t>
+            </a:r>
+            <a:r>
+              <a:rPr lang="tr-TR" dirty="0" err="1"/>
+              <a:t>mozarella</a:t>
+            </a:r>
+            <a:r>
+              <a:rPr lang="tr-TR" dirty="0"/>
+              <a:t> </a:t>
+            </a:r>
+            <a:r>
+              <a:rPr lang="tr-TR" dirty="0" err="1"/>
+              <a:t>rind</a:t>
+            </a:r>
+            <a:endParaRPr lang="en-US" dirty="0"/>
+          </a:p>
+          <a:p>
+            <a:endParaRPr lang="en-US" dirty="0"/>
+          </a:p>
+          <a:p>
+            <a:pPr marL="0" indent="0">
+              <a:buNone/>
+            </a:pPr>
             <a:endParaRPr lang="en-US" dirty="0"/>
           </a:p>
         </p:txBody>
@@ -5961,7 +6268,7 @@
     </p:spTree>
     <p:extLst>
       <p:ext uri="{BB962C8B-B14F-4D97-AF65-F5344CB8AC3E}">
-        <p14:creationId xmlns:p14="http://schemas.microsoft.com/office/powerpoint/2010/main" val="136936580"/>
+        <p14:creationId xmlns:p14="http://schemas.microsoft.com/office/powerpoint/2010/main" val="62885129"/>
       </p:ext>
     </p:extLst>
   </p:cSld>
@@ -6083,16 +6390,12 @@
               <a:buChar char="Ø"/>
             </a:pPr>
             <a:r>
+              <a:rPr lang="tr-TR" sz="2000" dirty="0"/>
+              <a:t>Word </a:t>
+            </a:r>
+            <a:r>
               <a:rPr lang="tr-TR" sz="2000" dirty="0" err="1"/>
-              <a:t>Tf-idf</a:t>
-            </a:r>
-            <a:r>
-              <a:rPr lang="tr-TR" sz="2000" dirty="0"/>
-              <a:t> </a:t>
-            </a:r>
-            <a:r>
-              <a:rPr lang="tr-TR" sz="2000" dirty="0" err="1"/>
-              <a:t>Vectors</a:t>
+              <a:t>Embeddings</a:t>
             </a:r>
             <a:endParaRPr lang="tr-TR" sz="2000" dirty="0"/>
           </a:p>
@@ -6116,7 +6419,7 @@
             </a:r>
             <a:r>
               <a:rPr lang="tr-TR" sz="1800" dirty="0"/>
-              <a:t>  . %</a:t>
+              <a:t>  3.2%</a:t>
             </a:r>
           </a:p>
           <a:p>
@@ -6131,235 +6434,15 @@
             </a:r>
             <a:r>
               <a:rPr lang="tr-TR" sz="1800" b="1" dirty="0"/>
-              <a:t>: .</a:t>
+              <a:t>: </a:t>
             </a:r>
             <a:r>
               <a:rPr lang="tr-TR" sz="1800" dirty="0"/>
-              <a:t>% </a:t>
-            </a:r>
-            <a:r>
-              <a:rPr lang="tr-TR" sz="1800" dirty="0" err="1"/>
-              <a:t>correct</a:t>
-            </a:r>
-            <a:r>
-              <a:rPr lang="tr-TR" sz="1800" dirty="0"/>
+              <a:t>62.9</a:t>
+            </a:r>
+            <a:r>
+              <a:rPr lang="tr-TR" sz="1800" b="1" dirty="0"/>
               <a:t> </a:t>
-            </a:r>
-            <a:r>
-              <a:rPr lang="tr-TR" sz="1800" dirty="0" err="1"/>
-              <a:t>normalization</a:t>
-            </a:r>
-            <a:r>
-              <a:rPr lang="tr-TR" sz="1800" dirty="0"/>
-              <a:t> in dev set</a:t>
-            </a:r>
-          </a:p>
-          <a:p>
-            <a:pPr marL="91440" lvl="2" indent="-91440">
-              <a:spcBef>
-                <a:spcPts val="1200"/>
-              </a:spcBef>
-              <a:spcAft>
-                <a:spcPts val="200"/>
-              </a:spcAft>
-              <a:buSzPct val="100000"/>
-              <a:buFont typeface="Wingdings" panose="05000000000000000000" pitchFamily="2" charset="2"/>
-              <a:buChar char="Ø"/>
-            </a:pPr>
-            <a:r>
-              <a:rPr lang="tr-TR" sz="2000" dirty="0" err="1"/>
-              <a:t>Rule</a:t>
-            </a:r>
-            <a:r>
-              <a:rPr lang="tr-TR" sz="2000" dirty="0"/>
-              <a:t> </a:t>
-            </a:r>
-            <a:r>
-              <a:rPr lang="tr-TR" sz="2000" dirty="0" err="1"/>
-              <a:t>based</a:t>
-            </a:r>
-            <a:r>
-              <a:rPr lang="tr-TR" sz="2000" dirty="0"/>
-              <a:t> </a:t>
-            </a:r>
-            <a:r>
-              <a:rPr lang="tr-TR" sz="2000" dirty="0" err="1"/>
-              <a:t>Normalization</a:t>
-            </a:r>
-            <a:endParaRPr lang="tr-TR" sz="2000" dirty="0"/>
-          </a:p>
-          <a:p>
-            <a:pPr lvl="3">
-              <a:lnSpc>
-                <a:spcPct val="100000"/>
-              </a:lnSpc>
-            </a:pPr>
-            <a:r>
-              <a:rPr lang="tr-TR" sz="1800" dirty="0" err="1"/>
-              <a:t>Improvement</a:t>
-            </a:r>
-            <a:r>
-              <a:rPr lang="tr-TR" sz="1800" dirty="0"/>
-              <a:t> </a:t>
-            </a:r>
-            <a:r>
-              <a:rPr lang="tr-TR" sz="1800" dirty="0" err="1"/>
-              <a:t>by</a:t>
-            </a:r>
-            <a:r>
-              <a:rPr lang="tr-TR" sz="1800" dirty="0"/>
-              <a:t>  . %</a:t>
-            </a:r>
-          </a:p>
-          <a:p>
-            <a:pPr lvl="3">
-              <a:lnSpc>
-                <a:spcPct val="100000"/>
-              </a:lnSpc>
-            </a:pPr>
-            <a:r>
-              <a:rPr lang="tr-TR" sz="1800" b="1" dirty="0" err="1"/>
-              <a:t>Performance</a:t>
-            </a:r>
-            <a:r>
-              <a:rPr lang="tr-TR" sz="1800" b="1" dirty="0"/>
-              <a:t>: .</a:t>
-            </a:r>
-            <a:r>
-              <a:rPr lang="tr-TR" sz="1800" dirty="0"/>
-              <a:t>% </a:t>
-            </a:r>
-            <a:r>
-              <a:rPr lang="tr-TR" sz="1800" dirty="0" err="1"/>
-              <a:t>correct</a:t>
-            </a:r>
-            <a:r>
-              <a:rPr lang="tr-TR" sz="1800" dirty="0"/>
-              <a:t> </a:t>
-            </a:r>
-            <a:r>
-              <a:rPr lang="tr-TR" sz="1800" dirty="0" err="1"/>
-              <a:t>normalization</a:t>
-            </a:r>
-            <a:r>
-              <a:rPr lang="tr-TR" sz="1800" dirty="0"/>
-              <a:t> in dev set</a:t>
-            </a:r>
-          </a:p>
-          <a:p>
-            <a:pPr lvl="2">
-              <a:buFont typeface="Wingdings" panose="05000000000000000000" pitchFamily="2" charset="2"/>
-              <a:buChar char="Ø"/>
-            </a:pPr>
-            <a:r>
-              <a:rPr lang="tr-TR" dirty="0" err="1"/>
-              <a:t>e.g</a:t>
-            </a:r>
-            <a:r>
-              <a:rPr lang="tr-TR" dirty="0"/>
-              <a:t>. ‘</a:t>
-            </a:r>
-            <a:r>
-              <a:rPr lang="tr-TR" dirty="0" err="1"/>
-              <a:t>rind</a:t>
-            </a:r>
-            <a:r>
-              <a:rPr lang="tr-TR" dirty="0"/>
-              <a:t>’</a:t>
-            </a:r>
-          </a:p>
-          <a:p>
-            <a:pPr lvl="2">
-              <a:buFont typeface="Wingdings" panose="05000000000000000000" pitchFamily="2" charset="2"/>
-              <a:buChar char="Ø"/>
-            </a:pPr>
-            <a:r>
-              <a:rPr lang="tr-TR" dirty="0" err="1"/>
-              <a:t>Cheese</a:t>
-            </a:r>
-            <a:r>
-              <a:rPr lang="tr-TR" dirty="0"/>
-              <a:t> </a:t>
-            </a:r>
-            <a:r>
-              <a:rPr lang="tr-TR" dirty="0" err="1"/>
-              <a:t>rind</a:t>
-            </a:r>
-            <a:r>
-              <a:rPr lang="tr-TR" dirty="0"/>
-              <a:t>, </a:t>
-            </a:r>
-            <a:r>
-              <a:rPr lang="tr-TR" dirty="0" err="1"/>
-              <a:t>mozarella</a:t>
-            </a:r>
-            <a:r>
-              <a:rPr lang="tr-TR" dirty="0"/>
-              <a:t> </a:t>
-            </a:r>
-            <a:r>
-              <a:rPr lang="tr-TR" dirty="0" err="1"/>
-              <a:t>rind</a:t>
-            </a:r>
-            <a:endParaRPr lang="tr-TR" b="1" dirty="0"/>
-          </a:p>
-          <a:p>
-            <a:pPr marL="91440" lvl="2" indent="-91440">
-              <a:spcBef>
-                <a:spcPts val="1200"/>
-              </a:spcBef>
-              <a:spcAft>
-                <a:spcPts val="200"/>
-              </a:spcAft>
-              <a:buSzPct val="100000"/>
-              <a:buFont typeface="Wingdings" panose="05000000000000000000" pitchFamily="2" charset="2"/>
-              <a:buChar char="Ø"/>
-            </a:pPr>
-            <a:r>
-              <a:rPr lang="tr-TR" sz="2000" dirty="0" err="1"/>
-              <a:t>Bio</a:t>
-            </a:r>
-            <a:r>
-              <a:rPr lang="tr-TR" sz="2000" dirty="0"/>
-              <a:t>-bert</a:t>
-            </a:r>
-          </a:p>
-          <a:p>
-            <a:pPr lvl="3">
-              <a:lnSpc>
-                <a:spcPct val="100000"/>
-              </a:lnSpc>
-            </a:pPr>
-            <a:r>
-              <a:rPr lang="tr-TR" sz="1800" dirty="0" err="1"/>
-              <a:t>Improvement</a:t>
-            </a:r>
-            <a:r>
-              <a:rPr lang="tr-TR" sz="1800" dirty="0"/>
-              <a:t> </a:t>
-            </a:r>
-            <a:r>
-              <a:rPr lang="tr-TR" sz="1800" dirty="0" err="1"/>
-              <a:t>by</a:t>
-            </a:r>
-            <a:r>
-              <a:rPr lang="tr-TR" sz="1800" dirty="0"/>
-              <a:t>  . %</a:t>
-            </a:r>
-          </a:p>
-          <a:p>
-            <a:pPr lvl="3">
-              <a:lnSpc>
-                <a:spcPct val="100000"/>
-              </a:lnSpc>
-            </a:pPr>
-            <a:r>
-              <a:rPr lang="tr-TR" sz="1800" b="1" dirty="0" err="1"/>
-              <a:t>Performance</a:t>
-            </a:r>
-            <a:r>
-              <a:rPr lang="tr-TR" sz="1800" b="1" dirty="0"/>
-              <a:t>: .</a:t>
             </a:r>
             <a:r>
               <a:rPr lang="tr-TR" sz="1800" dirty="0"/>
@@ -6400,7 +6483,7 @@
     </p:spTree>
     <p:extLst>
       <p:ext uri="{BB962C8B-B14F-4D97-AF65-F5344CB8AC3E}">
-        <p14:creationId xmlns:p14="http://schemas.microsoft.com/office/powerpoint/2010/main" val="62885129"/>
+        <p14:creationId xmlns:p14="http://schemas.microsoft.com/office/powerpoint/2010/main" val="790233289"/>
       </p:ext>
     </p:extLst>
   </p:cSld>
@@ -6498,14 +6581,14 @@
             <p:ph idx="1"/>
             <p:extLst>
               <p:ext uri="{D42A27DB-BD31-4B8C-83A1-F6EECF244321}">
-                <p14:modId xmlns:p14="http://schemas.microsoft.com/office/powerpoint/2010/main" val="3988383441"/>
+                <p14:modId xmlns:p14="http://schemas.microsoft.com/office/powerpoint/2010/main" val="3093284775"/>
               </p:ext>
             </p:extLst>
           </p:nvPr>
         </p:nvGraphicFramePr>
         <p:xfrm>
           <a:off x="1096961" y="1846263"/>
-          <a:ext cx="10058400" cy="3820110"/>
+          <a:ext cx="10058400" cy="4240181"/>
         </p:xfrm>
         <a:graphic>
           <a:graphicData uri="http://schemas.openxmlformats.org/drawingml/2006/table">
@@ -6536,7 +6619,7 @@
                   </a:extLst>
                 </a:gridCol>
               </a:tblGrid>
-              <a:tr h="545730">
+              <a:tr h="501904">
                 <a:tc>
                   <a:txBody>
                     <a:bodyPr/>
@@ -6599,7 +6682,7 @@
                   </a:ext>
                 </a:extLst>
               </a:tr>
-              <a:tr h="545730">
+              <a:tr h="501904">
                 <a:tc>
                   <a:txBody>
                     <a:bodyPr/>
@@ -6607,7 +6690,7 @@
                     <a:p>
                       <a:r>
                         <a:rPr lang="tr-TR" dirty="0" err="1"/>
-                        <a:t>Jaccard</a:t>
+                        <a:t>Exact</a:t>
                       </a:r>
                       <a:r>
                         <a:rPr lang="tr-TR" dirty="0"/>
@@ -6615,7 +6698,15 @@
                       </a:r>
                       <a:r>
                         <a:rPr lang="tr-TR" dirty="0" err="1"/>
-                        <a:t>Similarity</a:t>
+                        <a:t>Match</a:t>
+                      </a:r>
+                      <a:r>
+                        <a:rPr lang="tr-TR" dirty="0"/>
+                        <a:t> + </a:t>
+                      </a:r>
+                      <a:r>
+                        <a:rPr lang="tr-TR" dirty="0" err="1"/>
+                        <a:t>tf-idf</a:t>
                       </a:r>
                       <a:r>
                         <a:rPr lang="tr-TR" dirty="0"/>
@@ -6623,7 +6714,7 @@
                       </a:r>
                       <a:r>
                         <a:rPr lang="tr-TR" dirty="0" err="1"/>
-                        <a:t>by</a:t>
+                        <a:t>onto</a:t>
                       </a:r>
                       <a:r>
                         <a:rPr lang="tr-TR" dirty="0"/>
@@ -6631,7 +6722,7 @@
                       </a:r>
                       <a:r>
                         <a:rPr lang="tr-TR" dirty="0" err="1"/>
-                        <a:t>Tokens</a:t>
+                        <a:t>Biotope</a:t>
                       </a:r>
                       <a:endParaRPr lang="en-US" dirty="0"/>
                     </a:p>
@@ -6643,7 +6734,12 @@
                     <a:bodyPr/>
                     <a:lstStyle/>
                     <a:p>
-                      <a:endParaRPr lang="en-US"/>
+                      <a:pPr algn="ctr"/>
+                      <a:r>
+                        <a:rPr lang="tr-TR" dirty="0"/>
+                        <a:t>1%</a:t>
+                      </a:r>
+                      <a:endParaRPr lang="en-US" dirty="0"/>
                     </a:p>
                   </a:txBody>
                   <a:tcPr anchor="ctr"/>
@@ -6653,7 +6749,12 @@
                     <a:bodyPr/>
                     <a:lstStyle/>
                     <a:p>
-                      <a:endParaRPr lang="en-US"/>
+                      <a:pPr algn="ctr"/>
+                      <a:r>
+                        <a:rPr lang="tr-TR" dirty="0"/>
+                        <a:t>39%</a:t>
+                      </a:r>
+                      <a:endParaRPr lang="en-US" dirty="0"/>
                     </a:p>
                   </a:txBody>
                   <a:tcPr anchor="ctr"/>
@@ -6664,7 +6765,102 @@
                   </a:ext>
                 </a:extLst>
               </a:tr>
-              <a:tr h="545730">
+              <a:tr h="588677">
+                <a:tc>
+                  <a:txBody>
+                    <a:bodyPr/>
+                    <a:lstStyle/>
+                    <a:p>
+                      <a:r>
+                        <a:rPr lang="tr-TR" dirty="0" err="1"/>
+                        <a:t>Jaccard</a:t>
+                      </a:r>
+                      <a:r>
+                        <a:rPr lang="tr-TR" dirty="0"/>
+                        <a:t> </a:t>
+                      </a:r>
+                      <a:r>
+                        <a:rPr lang="tr-TR" dirty="0" err="1"/>
+                        <a:t>Similarity</a:t>
+                      </a:r>
+                      <a:r>
+                        <a:rPr lang="tr-TR" dirty="0"/>
+                        <a:t> </a:t>
+                      </a:r>
+                      <a:r>
+                        <a:rPr lang="tr-TR" dirty="0" err="1"/>
+                        <a:t>by</a:t>
+                      </a:r>
+                      <a:r>
+                        <a:rPr lang="tr-TR" dirty="0"/>
+                        <a:t> </a:t>
+                      </a:r>
+                      <a:r>
+                        <a:rPr lang="tr-TR" dirty="0" err="1"/>
+                        <a:t>Tokens</a:t>
+                      </a:r>
+                      <a:endParaRPr lang="en-US" dirty="0"/>
+                    </a:p>
+                  </a:txBody>
+                  <a:tcPr anchor="ctr"/>
+                </a:tc>
+                <a:tc>
+                  <a:txBody>
+                    <a:bodyPr/>
+                    <a:lstStyle/>
+                    <a:p>
+                      <a:pPr algn="ctr"/>
+                      <a:r>
+                        <a:rPr lang="tr-TR" dirty="0"/>
+                        <a:t>2%</a:t>
+                      </a:r>
+                      <a:endParaRPr lang="en-US" dirty="0"/>
+                    </a:p>
+                  </a:txBody>
+                  <a:tcPr anchor="ctr"/>
+                </a:tc>
+                <a:tc>
+                  <a:txBody>
+                    <a:bodyPr/>
+                    <a:lstStyle/>
+                    <a:p>
+                      <a:pPr marL="0" marR="0" lvl="0" indent="0" algn="ctr" defTabSz="914400" rtl="0" eaLnBrk="1" fontAlgn="auto" latinLnBrk="0" hangingPunct="1">
+                        <a:lnSpc>
+                          <a:spcPct val="100000"/>
+                        </a:lnSpc>
+                        <a:spcBef>
+                          <a:spcPts val="0"/>
+                        </a:spcBef>
+                        <a:spcAft>
+                          <a:spcPts val="0"/>
+                        </a:spcAft>
+                        <a:buClrTx/>
+                        <a:buSzTx/>
+                        <a:buFontTx/>
+                        <a:buNone/>
+                        <a:tabLst/>
+                        <a:defRPr/>
+                      </a:pPr>
+                      <a:r>
+                        <a:rPr lang="tr-TR" dirty="0"/>
+                        <a:t>41%</a:t>
+                      </a:r>
+                      <a:endParaRPr lang="en-US" dirty="0"/>
+                    </a:p>
+                    <a:p>
+                      <a:pPr algn="ctr"/>
+                      <a:endParaRPr lang="en-US" dirty="0"/>
+                    </a:p>
+                  </a:txBody>
+                  <a:tcPr anchor="ctr"/>
+                </a:tc>
+                <a:extLst>
+                  <a:ext uri="{0D108BD9-81ED-4DB2-BD59-A6C34878D82A}">
+                    <a16:rowId xmlns:a16="http://schemas.microsoft.com/office/drawing/2014/main" val="2304387015"/>
+                  </a:ext>
+                </a:extLst>
+              </a:tr>
+              <a:tr h="501904">
                 <a:tc>
                   <a:txBody>
                     <a:bodyPr/>
@@ -6721,6 +6917,11 @@
                     <a:bodyPr/>
                     <a:lstStyle/>
                     <a:p>
+                      <a:pPr algn="ctr"/>
+                      <a:r>
+                        <a:rPr lang="tr-TR" dirty="0"/>
+                        <a:t>6%</a:t>
+                      </a:r>
                       <a:endParaRPr lang="en-US" dirty="0"/>
                     </a:p>
                   </a:txBody>
@@ -6731,18 +6932,23 @@
                     <a:bodyPr/>
                     <a:lstStyle/>
                     <a:p>
-                      <a:endParaRPr lang="en-US"/>
+                      <a:pPr algn="ctr"/>
+                      <a:r>
+                        <a:rPr lang="tr-TR" dirty="0"/>
+                        <a:t>47%</a:t>
+                      </a:r>
+                      <a:endParaRPr lang="en-US" dirty="0"/>
                     </a:p>
                   </a:txBody>
                   <a:tcPr anchor="ctr"/>
                 </a:tc>
                 <a:extLst>
                   <a:ext uri="{0D108BD9-81ED-4DB2-BD59-A6C34878D82A}">
-                    <a16:rowId xmlns:a16="http://schemas.microsoft.com/office/drawing/2014/main" val="2304387015"/>
+                    <a16:rowId xmlns:a16="http://schemas.microsoft.com/office/drawing/2014/main" val="3878349987"/>
                   </a:ext>
                 </a:extLst>
               </a:tr>
-              <a:tr h="545730">
+              <a:tr h="501904">
                 <a:tc>
                   <a:txBody>
                     <a:bodyPr/>
@@ -6778,6 +6984,11 @@
                     <a:bodyPr/>
                     <a:lstStyle/>
                     <a:p>
+                      <a:pPr algn="ctr"/>
+                      <a:r>
+                        <a:rPr lang="tr-TR" dirty="0"/>
+                        <a:t>4%</a:t>
+                      </a:r>
                       <a:endParaRPr lang="en-US" dirty="0"/>
                     </a:p>
                   </a:txBody>
@@ -6788,34 +6999,43 @@
                     <a:bodyPr/>
                     <a:lstStyle/>
                     <a:p>
-                      <a:endParaRPr lang="en-US"/>
+                      <a:pPr algn="ctr"/>
+                      <a:r>
+                        <a:rPr lang="tr-TR" dirty="0"/>
+                        <a:t>51%</a:t>
+                      </a:r>
+                      <a:endParaRPr lang="en-US" dirty="0"/>
                     </a:p>
                   </a:txBody>
                   <a:tcPr anchor="ctr"/>
                 </a:tc>
                 <a:extLst>
                   <a:ext uri="{0D108BD9-81ED-4DB2-BD59-A6C34878D82A}">
-                    <a16:rowId xmlns:a16="http://schemas.microsoft.com/office/drawing/2014/main" val="3878349987"/>
+                    <a16:rowId xmlns:a16="http://schemas.microsoft.com/office/drawing/2014/main" val="743764457"/>
                   </a:ext>
                 </a:extLst>
               </a:tr>
-              <a:tr h="545730">
+              <a:tr h="501904">
                 <a:tc>
                   <a:txBody>
                     <a:bodyPr/>
                     <a:lstStyle/>
                     <a:p>
                       <a:r>
+                        <a:rPr lang="tr-TR" dirty="0"/>
+                        <a:t>Pos-</a:t>
+                      </a:r>
+                      <a:r>
                         <a:rPr lang="tr-TR" dirty="0" err="1"/>
-                        <a:t>Tf-idf</a:t>
+                        <a:t>tagger</a:t>
                       </a:r>
                       <a:r>
                         <a:rPr lang="tr-TR" dirty="0"/>
-                        <a:t> </a:t>
+                        <a:t>, </a:t>
                       </a:r>
                       <a:r>
                         <a:rPr lang="tr-TR" dirty="0" err="1"/>
-                        <a:t>Vectors</a:t>
+                        <a:t>Headword</a:t>
                       </a:r>
                       <a:endParaRPr lang="tr-TR" dirty="0"/>
                     </a:p>
@@ -6827,6 +7047,11 @@
                     <a:bodyPr/>
                     <a:lstStyle/>
                     <a:p>
+                      <a:pPr algn="ctr"/>
+                      <a:r>
+                        <a:rPr lang="tr-TR" dirty="0"/>
+                        <a:t>4.4%</a:t>
+                      </a:r>
                       <a:endParaRPr lang="en-US" dirty="0"/>
                     </a:p>
                   </a:txBody>
@@ -6837,50 +7062,11 @@
                     <a:bodyPr/>
                     <a:lstStyle/>
                     <a:p>
-                      <a:endParaRPr lang="en-US"/>
-                    </a:p>
-                  </a:txBody>
-                  <a:tcPr anchor="ctr"/>
-                </a:tc>
-                <a:extLst>
-                  <a:ext uri="{0D108BD9-81ED-4DB2-BD59-A6C34878D82A}">
-                    <a16:rowId xmlns:a16="http://schemas.microsoft.com/office/drawing/2014/main" val="743764457"/>
-                  </a:ext>
-                </a:extLst>
-              </a:tr>
-              <a:tr h="545730">
-                <a:tc>
-                  <a:txBody>
-                    <a:bodyPr/>
-                    <a:lstStyle/>
-                    <a:p>
-                      <a:r>
-                        <a:rPr lang="tr-TR" dirty="0" err="1"/>
-                        <a:t>Bio</a:t>
-                      </a:r>
+                      <a:pPr algn="ctr"/>
                       <a:r>
                         <a:rPr lang="tr-TR" dirty="0"/>
-                        <a:t>-bert</a:t>
-                      </a:r>
-                    </a:p>
-                  </a:txBody>
-                  <a:tcPr anchor="ctr"/>
-                </a:tc>
-                <a:tc>
-                  <a:txBody>
-                    <a:bodyPr/>
-                    <a:lstStyle/>
-                    <a:p>
-                      <a:endParaRPr lang="en-US" dirty="0"/>
-                    </a:p>
-                  </a:txBody>
-                  <a:tcPr anchor="ctr"/>
-                </a:tc>
-                <a:tc>
-                  <a:txBody>
-                    <a:bodyPr/>
-                    <a:lstStyle/>
-                    <a:p>
+                        <a:t>55.4%</a:t>
+                      </a:r>
                       <a:endParaRPr lang="en-US" dirty="0"/>
                     </a:p>
                   </a:txBody>
@@ -6892,7 +7078,7 @@
                   </a:ext>
                 </a:extLst>
               </a:tr>
-              <a:tr h="545730">
+              <a:tr h="588677">
                 <a:tc>
                   <a:txBody>
                     <a:bodyPr/>
@@ -6900,7 +7086,7 @@
                     <a:p>
                       <a:r>
                         <a:rPr lang="tr-TR" dirty="0" err="1"/>
-                        <a:t>Rule-base</a:t>
+                        <a:t>Jaccard</a:t>
                       </a:r>
                       <a:r>
                         <a:rPr lang="tr-TR" dirty="0"/>
@@ -6908,7 +7094,65 @@
                       </a:r>
                       <a:r>
                         <a:rPr lang="tr-TR" dirty="0" err="1"/>
-                        <a:t>Normalization</a:t>
+                        <a:t>Average</a:t>
+                      </a:r>
+                      <a:r>
+                        <a:rPr lang="tr-TR" dirty="0"/>
+                        <a:t> + Rules</a:t>
+                      </a:r>
+                    </a:p>
+                  </a:txBody>
+                  <a:tcPr anchor="ctr"/>
+                </a:tc>
+                <a:tc>
+                  <a:txBody>
+                    <a:bodyPr/>
+                    <a:lstStyle/>
+                    <a:p>
+                      <a:pPr algn="ctr"/>
+                      <a:r>
+                        <a:rPr lang="tr-TR" dirty="0"/>
+                        <a:t>4.3%</a:t>
+                      </a:r>
+                      <a:endParaRPr lang="en-US" dirty="0"/>
+                    </a:p>
+                  </a:txBody>
+                  <a:tcPr anchor="ctr"/>
+                </a:tc>
+                <a:tc>
+                  <a:txBody>
+                    <a:bodyPr/>
+                    <a:lstStyle/>
+                    <a:p>
+                      <a:pPr algn="ctr"/>
+                      <a:r>
+                        <a:rPr lang="tr-TR" dirty="0"/>
+                        <a:t>59.7%</a:t>
+                      </a:r>
+                      <a:endParaRPr lang="en-US" dirty="0"/>
+                    </a:p>
+                  </a:txBody>
+                  <a:tcPr anchor="ctr"/>
+                </a:tc>
+                <a:extLst>
+                  <a:ext uri="{0D108BD9-81ED-4DB2-BD59-A6C34878D82A}">
+                    <a16:rowId xmlns:a16="http://schemas.microsoft.com/office/drawing/2014/main" val="416100336"/>
+                  </a:ext>
+                </a:extLst>
+              </a:tr>
+              <a:tr h="501904">
+                <a:tc>
+                  <a:txBody>
+                    <a:bodyPr/>
+                    <a:lstStyle/>
+                    <a:p>
+                      <a:r>
+                        <a:rPr lang="tr-TR" dirty="0"/>
+                        <a:t>Word </a:t>
+                      </a:r>
+                      <a:r>
+                        <a:rPr lang="tr-TR" dirty="0" err="1"/>
+                        <a:t>Embedding</a:t>
                       </a:r>
                       <a:endParaRPr lang="tr-TR" dirty="0"/>
                     </a:p>
@@ -6920,6 +7164,11 @@
                     <a:bodyPr/>
                     <a:lstStyle/>
                     <a:p>
+                      <a:pPr algn="ctr"/>
+                      <a:r>
+                        <a:rPr lang="tr-TR" dirty="0"/>
+                        <a:t>3.2%</a:t>
+                      </a:r>
                       <a:endParaRPr lang="en-US" dirty="0"/>
                     </a:p>
                   </a:txBody>
@@ -6930,6 +7179,11 @@
                     <a:bodyPr/>
                     <a:lstStyle/>
                     <a:p>
+                      <a:pPr algn="ctr"/>
+                      <a:r>
+                        <a:rPr lang="tr-TR" dirty="0"/>
+                        <a:t>62.9%</a:t>
+                      </a:r>
                       <a:endParaRPr lang="en-US" dirty="0"/>
                     </a:p>
                   </a:txBody>
@@ -6937,7 +7191,7 @@
                 </a:tc>
                 <a:extLst>
                   <a:ext uri="{0D108BD9-81ED-4DB2-BD59-A6C34878D82A}">
-                    <a16:rowId xmlns:a16="http://schemas.microsoft.com/office/drawing/2014/main" val="841159170"/>
+                    <a16:rowId xmlns:a16="http://schemas.microsoft.com/office/drawing/2014/main" val="4065768508"/>
                   </a:ext>
                 </a:extLst>
               </a:tr>

</xml_diff>